<commit_message>
Added the main page json file.
</commit_message>
<xml_diff>
--- a/doc/designDoc.pptx
+++ b/doc/designDoc.pptx
@@ -262,7 +262,7 @@
           <a:p>
             <a:fld id="{CD7A883B-9441-489A-A520-EE2895922BEC}" type="datetimeFigureOut">
               <a:rPr lang="en-SG" smtClean="0"/>
-              <a:t>13/10/2022</a:t>
+              <a:t>20/10/2022</a:t>
             </a:fld>
             <a:endParaRPr lang="en-SG"/>
           </a:p>
@@ -462,7 +462,7 @@
           <a:p>
             <a:fld id="{CD7A883B-9441-489A-A520-EE2895922BEC}" type="datetimeFigureOut">
               <a:rPr lang="en-SG" smtClean="0"/>
-              <a:t>13/10/2022</a:t>
+              <a:t>20/10/2022</a:t>
             </a:fld>
             <a:endParaRPr lang="en-SG"/>
           </a:p>
@@ -672,7 +672,7 @@
           <a:p>
             <a:fld id="{CD7A883B-9441-489A-A520-EE2895922BEC}" type="datetimeFigureOut">
               <a:rPr lang="en-SG" smtClean="0"/>
-              <a:t>13/10/2022</a:t>
+              <a:t>20/10/2022</a:t>
             </a:fld>
             <a:endParaRPr lang="en-SG"/>
           </a:p>
@@ -872,7 +872,7 @@
           <a:p>
             <a:fld id="{CD7A883B-9441-489A-A520-EE2895922BEC}" type="datetimeFigureOut">
               <a:rPr lang="en-SG" smtClean="0"/>
-              <a:t>13/10/2022</a:t>
+              <a:t>20/10/2022</a:t>
             </a:fld>
             <a:endParaRPr lang="en-SG"/>
           </a:p>
@@ -1148,7 +1148,7 @@
           <a:p>
             <a:fld id="{CD7A883B-9441-489A-A520-EE2895922BEC}" type="datetimeFigureOut">
               <a:rPr lang="en-SG" smtClean="0"/>
-              <a:t>13/10/2022</a:t>
+              <a:t>20/10/2022</a:t>
             </a:fld>
             <a:endParaRPr lang="en-SG"/>
           </a:p>
@@ -1416,7 +1416,7 @@
           <a:p>
             <a:fld id="{CD7A883B-9441-489A-A520-EE2895922BEC}" type="datetimeFigureOut">
               <a:rPr lang="en-SG" smtClean="0"/>
-              <a:t>13/10/2022</a:t>
+              <a:t>20/10/2022</a:t>
             </a:fld>
             <a:endParaRPr lang="en-SG"/>
           </a:p>
@@ -1831,7 +1831,7 @@
           <a:p>
             <a:fld id="{CD7A883B-9441-489A-A520-EE2895922BEC}" type="datetimeFigureOut">
               <a:rPr lang="en-SG" smtClean="0"/>
-              <a:t>13/10/2022</a:t>
+              <a:t>20/10/2022</a:t>
             </a:fld>
             <a:endParaRPr lang="en-SG"/>
           </a:p>
@@ -1973,7 +1973,7 @@
           <a:p>
             <a:fld id="{CD7A883B-9441-489A-A520-EE2895922BEC}" type="datetimeFigureOut">
               <a:rPr lang="en-SG" smtClean="0"/>
-              <a:t>13/10/2022</a:t>
+              <a:t>20/10/2022</a:t>
             </a:fld>
             <a:endParaRPr lang="en-SG"/>
           </a:p>
@@ -2086,7 +2086,7 @@
           <a:p>
             <a:fld id="{CD7A883B-9441-489A-A520-EE2895922BEC}" type="datetimeFigureOut">
               <a:rPr lang="en-SG" smtClean="0"/>
-              <a:t>13/10/2022</a:t>
+              <a:t>20/10/2022</a:t>
             </a:fld>
             <a:endParaRPr lang="en-SG"/>
           </a:p>
@@ -2399,7 +2399,7 @@
           <a:p>
             <a:fld id="{CD7A883B-9441-489A-A520-EE2895922BEC}" type="datetimeFigureOut">
               <a:rPr lang="en-SG" smtClean="0"/>
-              <a:t>13/10/2022</a:t>
+              <a:t>20/10/2022</a:t>
             </a:fld>
             <a:endParaRPr lang="en-SG"/>
           </a:p>
@@ -2688,7 +2688,7 @@
           <a:p>
             <a:fld id="{CD7A883B-9441-489A-A520-EE2895922BEC}" type="datetimeFigureOut">
               <a:rPr lang="en-SG" smtClean="0"/>
-              <a:t>13/10/2022</a:t>
+              <a:t>20/10/2022</a:t>
             </a:fld>
             <a:endParaRPr lang="en-SG"/>
           </a:p>
@@ -2931,7 +2931,7 @@
           <a:p>
             <a:fld id="{CD7A883B-9441-489A-A520-EE2895922BEC}" type="datetimeFigureOut">
               <a:rPr lang="en-SG" smtClean="0"/>
-              <a:t>13/10/2022</a:t>
+              <a:t>20/10/2022</a:t>
             </a:fld>
             <a:endParaRPr lang="en-SG"/>
           </a:p>
@@ -3350,6 +3350,60 @@
       </p:grpSpPr>
       <p:sp>
         <p:nvSpPr>
+          <p:cNvPr id="6" name="Rectangle 5">
+            <a:extLst>
+              <a:ext uri="{FF2B5EF4-FFF2-40B4-BE49-F238E27FC236}">
+                <a16:creationId xmlns:a16="http://schemas.microsoft.com/office/drawing/2014/main" id="{B3868545-B913-AF8A-E4DB-928E13545101}"/>
+              </a:ext>
+            </a:extLst>
+          </p:cNvPr>
+          <p:cNvSpPr/>
+          <p:nvPr/>
+        </p:nvSpPr>
+        <p:spPr>
+          <a:xfrm>
+            <a:off x="691375" y="791372"/>
+            <a:ext cx="8028879" cy="5146778"/>
+          </a:xfrm>
+          <a:prstGeom prst="rect">
+            <a:avLst/>
+          </a:prstGeom>
+          <a:solidFill>
+            <a:schemeClr val="accent1">
+              <a:lumMod val="20000"/>
+              <a:lumOff val="80000"/>
+            </a:schemeClr>
+          </a:solidFill>
+        </p:spPr>
+        <p:style>
+          <a:lnRef idx="2">
+            <a:schemeClr val="accent1">
+              <a:shade val="50000"/>
+            </a:schemeClr>
+          </a:lnRef>
+          <a:fillRef idx="1">
+            <a:schemeClr val="accent1"/>
+          </a:fillRef>
+          <a:effectRef idx="0">
+            <a:schemeClr val="accent1"/>
+          </a:effectRef>
+          <a:fontRef idx="minor">
+            <a:schemeClr val="lt1"/>
+          </a:fontRef>
+        </p:style>
+        <p:txBody>
+          <a:bodyPr rtlCol="0" anchor="ctr"/>
+          <a:lstStyle/>
+          <a:p>
+            <a:pPr algn="ctr"/>
+            <a:endParaRPr lang="en-SG" dirty="0">
+              <a:noFill/>
+            </a:endParaRPr>
+          </a:p>
+        </p:txBody>
+      </p:sp>
+      <p:sp>
+        <p:nvSpPr>
           <p:cNvPr id="36" name="矩形 9">
             <a:extLst>
               <a:ext uri="{FF2B5EF4-FFF2-40B4-BE49-F238E27FC236}">
@@ -3362,7 +3416,7 @@
         </p:nvSpPr>
         <p:spPr>
           <a:xfrm>
-            <a:off x="2712627" y="4017418"/>
+            <a:off x="1118002" y="4586130"/>
             <a:ext cx="1544208" cy="1140781"/>
           </a:xfrm>
           <a:prstGeom prst="rect">
@@ -3409,7 +3463,7 @@
         </p:nvSpPr>
         <p:spPr>
           <a:xfrm>
-            <a:off x="2664407" y="3994912"/>
+            <a:off x="1069782" y="4563624"/>
             <a:ext cx="1950336" cy="276999"/>
           </a:xfrm>
           <a:prstGeom prst="rect">
@@ -3453,7 +3507,7 @@
         </p:nvSpPr>
         <p:spPr>
           <a:xfrm>
-            <a:off x="4590288" y="4017418"/>
+            <a:off x="2995663" y="4586130"/>
             <a:ext cx="1712378" cy="1140781"/>
           </a:xfrm>
           <a:prstGeom prst="rect">
@@ -3500,7 +3554,7 @@
         </p:nvSpPr>
         <p:spPr>
           <a:xfrm>
-            <a:off x="6808723" y="2626112"/>
+            <a:off x="5214098" y="3194824"/>
             <a:ext cx="2993645" cy="1643752"/>
           </a:xfrm>
           <a:prstGeom prst="rect">
@@ -3547,7 +3601,7 @@
         </p:nvSpPr>
         <p:spPr>
           <a:xfrm>
-            <a:off x="6808723" y="2626111"/>
+            <a:off x="5214098" y="3194823"/>
             <a:ext cx="1641854" cy="338554"/>
           </a:xfrm>
           <a:prstGeom prst="rect">
@@ -3599,7 +3653,7 @@
         </p:blipFill>
         <p:spPr>
           <a:xfrm>
-            <a:off x="7905447" y="3203415"/>
+            <a:off x="6310822" y="3772127"/>
             <a:ext cx="752381" cy="585715"/>
           </a:xfrm>
           <a:prstGeom prst="rect">
@@ -3623,7 +3677,7 @@
         </p:nvCxnSpPr>
         <p:spPr>
           <a:xfrm flipV="1">
-            <a:off x="8129239" y="1688244"/>
+            <a:off x="6534614" y="2256956"/>
             <a:ext cx="0" cy="1640172"/>
           </a:xfrm>
           <a:prstGeom prst="straightConnector1">
@@ -3662,7 +3716,7 @@
         </p:nvSpPr>
         <p:spPr>
           <a:xfrm>
-            <a:off x="7751433" y="2234240"/>
+            <a:off x="6156808" y="2802952"/>
             <a:ext cx="802249" cy="230832"/>
           </a:xfrm>
           <a:prstGeom prst="rect">
@@ -3706,7 +3760,7 @@
         </p:nvSpPr>
         <p:spPr>
           <a:xfrm>
-            <a:off x="7445946" y="1171708"/>
+            <a:off x="5851321" y="1740420"/>
             <a:ext cx="956953" cy="512956"/>
           </a:xfrm>
           <a:prstGeom prst="cloud">
@@ -3764,7 +3818,7 @@
         </p:blipFill>
         <p:spPr>
           <a:xfrm>
-            <a:off x="8044491" y="3313392"/>
+            <a:off x="6449866" y="3882104"/>
             <a:ext cx="370663" cy="370663"/>
           </a:xfrm>
           <a:prstGeom prst="rect">
@@ -3791,7 +3845,7 @@
         </p:nvSpPr>
         <p:spPr>
           <a:xfrm>
-            <a:off x="7450784" y="1565298"/>
+            <a:off x="5856159" y="2134010"/>
             <a:ext cx="802249" cy="507831"/>
           </a:xfrm>
           <a:prstGeom prst="rect">
@@ -3837,7 +3891,7 @@
         </p:nvCxnSpPr>
         <p:spPr>
           <a:xfrm flipV="1">
-            <a:off x="8372478" y="898986"/>
+            <a:off x="6777853" y="1467698"/>
             <a:ext cx="0" cy="2398743"/>
           </a:xfrm>
           <a:prstGeom prst="straightConnector1">
@@ -3876,7 +3930,7 @@
         </p:nvSpPr>
         <p:spPr>
           <a:xfrm>
-            <a:off x="7905064" y="351139"/>
+            <a:off x="6310439" y="919851"/>
             <a:ext cx="956953" cy="512956"/>
           </a:xfrm>
           <a:prstGeom prst="cloud">
@@ -3926,7 +3980,7 @@
         </p:nvSpPr>
         <p:spPr>
           <a:xfrm>
-            <a:off x="8415156" y="819372"/>
+            <a:off x="6820531" y="1388084"/>
             <a:ext cx="802249" cy="369332"/>
           </a:xfrm>
           <a:prstGeom prst="rect">
@@ -3973,7 +4027,7 @@
         </p:nvCxnSpPr>
         <p:spPr>
           <a:xfrm flipH="1">
-            <a:off x="5672160" y="3641379"/>
+            <a:off x="4077535" y="4210091"/>
             <a:ext cx="2232904" cy="1122645"/>
           </a:xfrm>
           <a:prstGeom prst="line">
@@ -4010,7 +4064,7 @@
         </p:nvSpPr>
         <p:spPr>
           <a:xfrm>
-            <a:off x="4522862" y="3985171"/>
+            <a:off x="2928237" y="4553883"/>
             <a:ext cx="1864242" cy="276999"/>
           </a:xfrm>
           <a:prstGeom prst="rect">
@@ -4069,7 +4123,7 @@
         </p:blipFill>
         <p:spPr bwMode="auto">
           <a:xfrm>
-            <a:off x="5097403" y="4542088"/>
+            <a:off x="3502778" y="5110800"/>
             <a:ext cx="524323" cy="524323"/>
           </a:xfrm>
           <a:prstGeom prst="rect">
@@ -4106,7 +4160,7 @@
         </p:nvSpPr>
         <p:spPr>
           <a:xfrm>
-            <a:off x="8329802" y="2249903"/>
+            <a:off x="6735177" y="2818615"/>
             <a:ext cx="802249" cy="230832"/>
           </a:xfrm>
           <a:prstGeom prst="rect">
@@ -4152,7 +4206,7 @@
         </p:nvCxnSpPr>
         <p:spPr>
           <a:xfrm flipH="1">
-            <a:off x="5632321" y="3539396"/>
+            <a:off x="4037696" y="4108108"/>
             <a:ext cx="2272743" cy="1142332"/>
           </a:xfrm>
           <a:prstGeom prst="straightConnector1">
@@ -4191,7 +4245,7 @@
         </p:nvSpPr>
         <p:spPr>
           <a:xfrm>
-            <a:off x="6387487" y="4039032"/>
+            <a:off x="4792862" y="4607744"/>
             <a:ext cx="802249" cy="230832"/>
           </a:xfrm>
           <a:prstGeom prst="rect">
@@ -4235,7 +4289,7 @@
         </p:nvSpPr>
         <p:spPr>
           <a:xfrm>
-            <a:off x="6280628" y="4375013"/>
+            <a:off x="4686003" y="4943725"/>
             <a:ext cx="802249" cy="230832"/>
           </a:xfrm>
           <a:prstGeom prst="rect">
@@ -4285,7 +4339,7 @@
         </p:nvCxnSpPr>
         <p:spPr>
           <a:xfrm flipH="1">
-            <a:off x="4078224" y="4838948"/>
+            <a:off x="2483599" y="5407660"/>
             <a:ext cx="1019179" cy="0"/>
           </a:xfrm>
           <a:prstGeom prst="line">
@@ -4324,7 +4378,7 @@
         </p:nvCxnSpPr>
         <p:spPr>
           <a:xfrm flipH="1">
-            <a:off x="4078224" y="4725022"/>
+            <a:off x="2483599" y="5293734"/>
             <a:ext cx="979810" cy="0"/>
           </a:xfrm>
           <a:prstGeom prst="straightConnector1">
@@ -4363,7 +4417,7 @@
         </p:nvSpPr>
         <p:spPr>
           <a:xfrm>
-            <a:off x="4522862" y="4510130"/>
+            <a:off x="2928237" y="5078842"/>
             <a:ext cx="802249" cy="230832"/>
           </a:xfrm>
           <a:prstGeom prst="rect">
@@ -4415,7 +4469,7 @@
         </p:blipFill>
         <p:spPr>
           <a:xfrm>
-            <a:off x="2873653" y="4510130"/>
+            <a:off x="1279028" y="5078842"/>
             <a:ext cx="1161905" cy="476190"/>
           </a:xfrm>
           <a:prstGeom prst="rect">
@@ -4442,7 +4496,7 @@
         </p:nvSpPr>
         <p:spPr>
           <a:xfrm>
-            <a:off x="4186688" y="4863765"/>
+            <a:off x="2592063" y="5432477"/>
             <a:ext cx="802249" cy="230832"/>
           </a:xfrm>
           <a:prstGeom prst="rect">
@@ -4490,7 +4544,7 @@
         </p:nvSpPr>
         <p:spPr>
           <a:xfrm>
-            <a:off x="5043542" y="4329781"/>
+            <a:off x="3448917" y="4898493"/>
             <a:ext cx="802249" cy="230832"/>
           </a:xfrm>
           <a:prstGeom prst="rect">
@@ -4534,7 +4588,7 @@
         </p:nvSpPr>
         <p:spPr>
           <a:xfrm>
-            <a:off x="2835620" y="4294417"/>
+            <a:off x="1240995" y="4863129"/>
             <a:ext cx="802249" cy="230832"/>
           </a:xfrm>
           <a:prstGeom prst="rect">
@@ -4578,7 +4632,7 @@
         </p:nvSpPr>
         <p:spPr>
           <a:xfrm>
-            <a:off x="8354429" y="3354262"/>
+            <a:off x="6759804" y="3922974"/>
             <a:ext cx="802249" cy="230832"/>
           </a:xfrm>
           <a:prstGeom prst="rect">
@@ -4616,7 +4670,7 @@
         </p:nvCxnSpPr>
         <p:spPr>
           <a:xfrm>
-            <a:off x="8281637" y="3641379"/>
+            <a:off x="6687012" y="4210091"/>
             <a:ext cx="0" cy="308314"/>
           </a:xfrm>
           <a:prstGeom prst="straightConnector1">
@@ -4658,7 +4712,7 @@
         </p:nvSpPr>
         <p:spPr>
           <a:xfrm>
-            <a:off x="8198082" y="3972558"/>
+            <a:off x="6603457" y="4541270"/>
             <a:ext cx="204817" cy="171879"/>
           </a:xfrm>
           <a:prstGeom prst="can">
@@ -4704,7 +4758,7 @@
         </p:nvSpPr>
         <p:spPr>
           <a:xfrm>
-            <a:off x="8402899" y="3918574"/>
+            <a:off x="6808274" y="4487286"/>
             <a:ext cx="802249" cy="230832"/>
           </a:xfrm>
           <a:prstGeom prst="rect">
@@ -4740,7 +4794,7 @@
         </p:nvSpPr>
         <p:spPr>
           <a:xfrm>
-            <a:off x="6357584" y="3145231"/>
+            <a:off x="4762959" y="3713943"/>
             <a:ext cx="802249" cy="230832"/>
           </a:xfrm>
           <a:prstGeom prst="rect">
@@ -4784,7 +4838,7 @@
         </p:nvSpPr>
         <p:spPr>
           <a:xfrm>
-            <a:off x="2725715" y="2208102"/>
+            <a:off x="1131090" y="2776814"/>
             <a:ext cx="2993645" cy="1643752"/>
           </a:xfrm>
           <a:prstGeom prst="rect">
@@ -4831,7 +4885,7 @@
         </p:nvSpPr>
         <p:spPr>
           <a:xfrm>
-            <a:off x="2725715" y="2208101"/>
+            <a:off x="1131090" y="2776813"/>
             <a:ext cx="1641854" cy="338554"/>
           </a:xfrm>
           <a:prstGeom prst="rect">
@@ -4877,7 +4931,7 @@
         </p:nvCxnSpPr>
         <p:spPr>
           <a:xfrm flipH="1" flipV="1">
-            <a:off x="5097403" y="3368815"/>
+            <a:off x="3502778" y="3937527"/>
             <a:ext cx="2819603" cy="7248"/>
           </a:xfrm>
           <a:prstGeom prst="straightConnector1">
@@ -4919,7 +4973,7 @@
         </p:nvSpPr>
         <p:spPr>
           <a:xfrm>
-            <a:off x="4273815" y="3300808"/>
+            <a:off x="2679190" y="3869520"/>
             <a:ext cx="802249" cy="329535"/>
           </a:xfrm>
           <a:prstGeom prst="rect">
@@ -4971,7 +5025,7 @@
         </p:nvCxnSpPr>
         <p:spPr>
           <a:xfrm flipV="1">
-            <a:off x="4831301" y="3101825"/>
+            <a:off x="3236676" y="3670537"/>
             <a:ext cx="0" cy="198983"/>
           </a:xfrm>
           <a:prstGeom prst="straightConnector1">
@@ -5021,7 +5075,7 @@
         </p:blipFill>
         <p:spPr>
           <a:xfrm>
-            <a:off x="4473678" y="2456491"/>
+            <a:off x="2879053" y="3025203"/>
             <a:ext cx="636948" cy="629395"/>
           </a:xfrm>
           <a:prstGeom prst="rect">
@@ -5045,7 +5099,7 @@
         </p:nvCxnSpPr>
         <p:spPr>
           <a:xfrm flipH="1" flipV="1">
-            <a:off x="3940843" y="3101825"/>
+            <a:off x="2346218" y="3670537"/>
             <a:ext cx="332972" cy="224699"/>
           </a:xfrm>
           <a:prstGeom prst="straightConnector1">
@@ -5087,7 +5141,7 @@
         </p:nvSpPr>
         <p:spPr>
           <a:xfrm rot="10800000">
-            <a:off x="3940843" y="2821642"/>
+            <a:off x="2346218" y="3390354"/>
             <a:ext cx="490159" cy="141665"/>
           </a:xfrm>
           <a:prstGeom prst="rightArrow">
@@ -5133,7 +5187,7 @@
         </p:nvSpPr>
         <p:spPr>
           <a:xfrm>
-            <a:off x="4423799" y="2169179"/>
+            <a:off x="2829174" y="2737891"/>
             <a:ext cx="1395842" cy="230832"/>
           </a:xfrm>
           <a:prstGeom prst="rect">
@@ -5184,7 +5238,7 @@
         </p:blipFill>
         <p:spPr bwMode="auto">
           <a:xfrm>
-            <a:off x="2903919" y="2709997"/>
+            <a:off x="1309294" y="3278709"/>
             <a:ext cx="1001478" cy="445101"/>
           </a:xfrm>
           <a:prstGeom prst="rect">
@@ -5221,7 +5275,7 @@
         </p:nvSpPr>
         <p:spPr>
           <a:xfrm>
-            <a:off x="2664407" y="1418534"/>
+            <a:off x="1069782" y="1987246"/>
             <a:ext cx="1176072" cy="230832"/>
           </a:xfrm>
           <a:prstGeom prst="rect">
@@ -5285,7 +5339,7 @@
         </p:blipFill>
         <p:spPr bwMode="auto">
           <a:xfrm>
-            <a:off x="3509311" y="1367394"/>
+            <a:off x="1914686" y="1936106"/>
             <a:ext cx="257116" cy="257116"/>
           </a:xfrm>
           <a:prstGeom prst="rect">
@@ -5319,7 +5373,7 @@
         </p:nvCxnSpPr>
         <p:spPr>
           <a:xfrm>
-            <a:off x="3445688" y="1656753"/>
+            <a:off x="1851063" y="2225465"/>
             <a:ext cx="0" cy="1010905"/>
           </a:xfrm>
           <a:prstGeom prst="straightConnector1">
@@ -5358,7 +5412,7 @@
         </p:nvSpPr>
         <p:spPr>
           <a:xfrm>
-            <a:off x="3411576" y="2436826"/>
+            <a:off x="1816951" y="3005538"/>
             <a:ext cx="802249" cy="230832"/>
           </a:xfrm>
           <a:prstGeom prst="rect">
@@ -5402,7 +5456,7 @@
         </p:nvSpPr>
         <p:spPr>
           <a:xfrm>
-            <a:off x="3967224" y="2669458"/>
+            <a:off x="2372599" y="3238170"/>
             <a:ext cx="802249" cy="230832"/>
           </a:xfrm>
           <a:prstGeom prst="rect">
@@ -5446,7 +5500,7 @@
         </p:nvSpPr>
         <p:spPr>
           <a:xfrm>
-            <a:off x="2597829" y="1649896"/>
+            <a:off x="1003204" y="2218608"/>
             <a:ext cx="2981960" cy="230832"/>
           </a:xfrm>
           <a:prstGeom prst="rect">
@@ -5504,8 +5558,8 @@
         </p:nvCxnSpPr>
         <p:spPr>
           <a:xfrm flipV="1">
-            <a:off x="2286000" y="2068595"/>
-            <a:ext cx="7635240" cy="0"/>
+            <a:off x="691375" y="2633949"/>
+            <a:ext cx="8028879" cy="3358"/>
           </a:xfrm>
           <a:prstGeom prst="line">
             <a:avLst/>
@@ -5543,7 +5597,7 @@
         </p:nvSpPr>
         <p:spPr>
           <a:xfrm>
-            <a:off x="8702636" y="1730714"/>
+            <a:off x="7108011" y="2299426"/>
             <a:ext cx="1523769" cy="369332"/>
           </a:xfrm>
           <a:prstGeom prst="rect">
@@ -5583,7 +5637,7 @@
         </p:nvSpPr>
         <p:spPr>
           <a:xfrm>
-            <a:off x="8754244" y="2065237"/>
+            <a:off x="7159619" y="2633949"/>
             <a:ext cx="1320499" cy="369332"/>
           </a:xfrm>
           <a:prstGeom prst="rect">
@@ -5606,6 +5660,91 @@
               <a:t>   </a:t>
             </a:r>
             <a:endParaRPr lang="en-SG" dirty="0"/>
+          </a:p>
+        </p:txBody>
+      </p:sp>
+      <p:pic>
+        <p:nvPicPr>
+          <p:cNvPr id="3" name="Picture 2" descr="Graphical user interface, text&#10;&#10;Description automatically generated with medium confidence">
+            <a:extLst>
+              <a:ext uri="{FF2B5EF4-FFF2-40B4-BE49-F238E27FC236}">
+                <a16:creationId xmlns:a16="http://schemas.microsoft.com/office/drawing/2014/main" id="{E90EE576-8FA6-57EA-06F1-80E41198B904}"/>
+              </a:ext>
+            </a:extLst>
+          </p:cNvPr>
+          <p:cNvPicPr>
+            <a:picLocks noChangeAspect="1"/>
+          </p:cNvPicPr>
+          <p:nvPr/>
+        </p:nvPicPr>
+        <p:blipFill>
+          <a:blip r:embed="rId9">
+            <a:extLst>
+              <a:ext uri="{28A0092B-C50C-407E-A947-70E740481C1C}">
+                <a14:useLocalDpi xmlns:a14="http://schemas.microsoft.com/office/drawing/2010/main" val="0"/>
+              </a:ext>
+            </a:extLst>
+          </a:blip>
+          <a:stretch>
+            <a:fillRect/>
+          </a:stretch>
+        </p:blipFill>
+        <p:spPr>
+          <a:xfrm>
+            <a:off x="5851321" y="5267997"/>
+            <a:ext cx="2742180" cy="597458"/>
+          </a:xfrm>
+          <a:prstGeom prst="rect">
+            <a:avLst/>
+          </a:prstGeom>
+          <a:ln w="3175">
+            <a:solidFill>
+              <a:schemeClr val="tx1"/>
+            </a:solidFill>
+          </a:ln>
+        </p:spPr>
+      </p:pic>
+      <p:sp>
+        <p:nvSpPr>
+          <p:cNvPr id="13" name="TextBox 12">
+            <a:extLst>
+              <a:ext uri="{FF2B5EF4-FFF2-40B4-BE49-F238E27FC236}">
+                <a16:creationId xmlns:a16="http://schemas.microsoft.com/office/drawing/2014/main" id="{BB8294A8-1035-782E-D523-671A5AE6B525}"/>
+              </a:ext>
+            </a:extLst>
+          </p:cNvPr>
+          <p:cNvSpPr txBox="1"/>
+          <p:nvPr/>
+        </p:nvSpPr>
+        <p:spPr>
+          <a:xfrm>
+            <a:off x="856976" y="925430"/>
+            <a:ext cx="4823403" cy="461665"/>
+          </a:xfrm>
+          <a:prstGeom prst="rect">
+            <a:avLst/>
+          </a:prstGeom>
+          <a:noFill/>
+        </p:spPr>
+        <p:txBody>
+          <a:bodyPr wrap="square" rtlCol="0">
+            <a:spAutoFit/>
+          </a:bodyPr>
+          <a:lstStyle/>
+          <a:p>
+            <a:r>
+              <a:rPr lang="en-US" sz="2400" b="1" dirty="0">
+                <a:solidFill>
+                  <a:srgbClr val="002060"/>
+                </a:solidFill>
+              </a:rPr>
+              <a:t>NCL-CIDEX Connection Monitor Hub</a:t>
+            </a:r>
+            <a:endParaRPr lang="en-SG" sz="2400" b="1" dirty="0">
+              <a:solidFill>
+                <a:srgbClr val="002060"/>
+              </a:solidFill>
+            </a:endParaRPr>
           </a:p>
         </p:txBody>
       </p:sp>

</xml_diff>

<commit_message>
Changed the work flow design diagram and adjust the map panel size.
</commit_message>
<xml_diff>
--- a/doc/designDoc.pptx
+++ b/doc/designDoc.pptx
@@ -262,7 +262,7 @@
           <a:p>
             <a:fld id="{CD7A883B-9441-489A-A520-EE2895922BEC}" type="datetimeFigureOut">
               <a:rPr lang="en-SG" smtClean="0"/>
-              <a:t>20/10/2022</a:t>
+              <a:t>26/10/2022</a:t>
             </a:fld>
             <a:endParaRPr lang="en-SG"/>
           </a:p>
@@ -462,7 +462,7 @@
           <a:p>
             <a:fld id="{CD7A883B-9441-489A-A520-EE2895922BEC}" type="datetimeFigureOut">
               <a:rPr lang="en-SG" smtClean="0"/>
-              <a:t>20/10/2022</a:t>
+              <a:t>26/10/2022</a:t>
             </a:fld>
             <a:endParaRPr lang="en-SG"/>
           </a:p>
@@ -672,7 +672,7 @@
           <a:p>
             <a:fld id="{CD7A883B-9441-489A-A520-EE2895922BEC}" type="datetimeFigureOut">
               <a:rPr lang="en-SG" smtClean="0"/>
-              <a:t>20/10/2022</a:t>
+              <a:t>26/10/2022</a:t>
             </a:fld>
             <a:endParaRPr lang="en-SG"/>
           </a:p>
@@ -872,7 +872,7 @@
           <a:p>
             <a:fld id="{CD7A883B-9441-489A-A520-EE2895922BEC}" type="datetimeFigureOut">
               <a:rPr lang="en-SG" smtClean="0"/>
-              <a:t>20/10/2022</a:t>
+              <a:t>26/10/2022</a:t>
             </a:fld>
             <a:endParaRPr lang="en-SG"/>
           </a:p>
@@ -1148,7 +1148,7 @@
           <a:p>
             <a:fld id="{CD7A883B-9441-489A-A520-EE2895922BEC}" type="datetimeFigureOut">
               <a:rPr lang="en-SG" smtClean="0"/>
-              <a:t>20/10/2022</a:t>
+              <a:t>26/10/2022</a:t>
             </a:fld>
             <a:endParaRPr lang="en-SG"/>
           </a:p>
@@ -1416,7 +1416,7 @@
           <a:p>
             <a:fld id="{CD7A883B-9441-489A-A520-EE2895922BEC}" type="datetimeFigureOut">
               <a:rPr lang="en-SG" smtClean="0"/>
-              <a:t>20/10/2022</a:t>
+              <a:t>26/10/2022</a:t>
             </a:fld>
             <a:endParaRPr lang="en-SG"/>
           </a:p>
@@ -1831,7 +1831,7 @@
           <a:p>
             <a:fld id="{CD7A883B-9441-489A-A520-EE2895922BEC}" type="datetimeFigureOut">
               <a:rPr lang="en-SG" smtClean="0"/>
-              <a:t>20/10/2022</a:t>
+              <a:t>26/10/2022</a:t>
             </a:fld>
             <a:endParaRPr lang="en-SG"/>
           </a:p>
@@ -1973,7 +1973,7 @@
           <a:p>
             <a:fld id="{CD7A883B-9441-489A-A520-EE2895922BEC}" type="datetimeFigureOut">
               <a:rPr lang="en-SG" smtClean="0"/>
-              <a:t>20/10/2022</a:t>
+              <a:t>26/10/2022</a:t>
             </a:fld>
             <a:endParaRPr lang="en-SG"/>
           </a:p>
@@ -2086,7 +2086,7 @@
           <a:p>
             <a:fld id="{CD7A883B-9441-489A-A520-EE2895922BEC}" type="datetimeFigureOut">
               <a:rPr lang="en-SG" smtClean="0"/>
-              <a:t>20/10/2022</a:t>
+              <a:t>26/10/2022</a:t>
             </a:fld>
             <a:endParaRPr lang="en-SG"/>
           </a:p>
@@ -2399,7 +2399,7 @@
           <a:p>
             <a:fld id="{CD7A883B-9441-489A-A520-EE2895922BEC}" type="datetimeFigureOut">
               <a:rPr lang="en-SG" smtClean="0"/>
-              <a:t>20/10/2022</a:t>
+              <a:t>26/10/2022</a:t>
             </a:fld>
             <a:endParaRPr lang="en-SG"/>
           </a:p>
@@ -2688,7 +2688,7 @@
           <a:p>
             <a:fld id="{CD7A883B-9441-489A-A520-EE2895922BEC}" type="datetimeFigureOut">
               <a:rPr lang="en-SG" smtClean="0"/>
-              <a:t>20/10/2022</a:t>
+              <a:t>26/10/2022</a:t>
             </a:fld>
             <a:endParaRPr lang="en-SG"/>
           </a:p>
@@ -2931,7 +2931,7 @@
           <a:p>
             <a:fld id="{CD7A883B-9441-489A-A520-EE2895922BEC}" type="datetimeFigureOut">
               <a:rPr lang="en-SG" smtClean="0"/>
-              <a:t>20/10/2022</a:t>
+              <a:t>26/10/2022</a:t>
             </a:fld>
             <a:endParaRPr lang="en-SG"/>
           </a:p>
@@ -3416,8 +3416,8 @@
         </p:nvSpPr>
         <p:spPr>
           <a:xfrm>
-            <a:off x="1118002" y="4586130"/>
-            <a:ext cx="1544208" cy="1140781"/>
+            <a:off x="1118002" y="4713149"/>
+            <a:ext cx="1544208" cy="1013762"/>
           </a:xfrm>
           <a:prstGeom prst="rect">
             <a:avLst/>
@@ -3463,7 +3463,7 @@
         </p:nvSpPr>
         <p:spPr>
           <a:xfrm>
-            <a:off x="1069782" y="4563624"/>
+            <a:off x="1078479" y="4675273"/>
             <a:ext cx="1950336" cy="276999"/>
           </a:xfrm>
           <a:prstGeom prst="rect">
@@ -3507,8 +3507,8 @@
         </p:nvSpPr>
         <p:spPr>
           <a:xfrm>
-            <a:off x="2995663" y="4586130"/>
-            <a:ext cx="1712378" cy="1140781"/>
+            <a:off x="2995663" y="4713149"/>
+            <a:ext cx="1712378" cy="1013762"/>
           </a:xfrm>
           <a:prstGeom prst="rect">
             <a:avLst/>
@@ -4064,7 +4064,7 @@
         </p:nvSpPr>
         <p:spPr>
           <a:xfrm>
-            <a:off x="2928237" y="4553883"/>
+            <a:off x="2950403" y="4700269"/>
             <a:ext cx="1864242" cy="276999"/>
           </a:xfrm>
           <a:prstGeom prst="rect">
@@ -4759,7 +4759,7 @@
         <p:spPr>
           <a:xfrm>
             <a:off x="6808274" y="4487286"/>
-            <a:ext cx="802249" cy="230832"/>
+            <a:ext cx="802249" cy="369332"/>
           </a:xfrm>
           <a:prstGeom prst="rect">
             <a:avLst/>
@@ -4774,7 +4774,7 @@
           <a:p>
             <a:r>
               <a:rPr lang="en-US" sz="900" dirty="0"/>
-              <a:t>Local storage</a:t>
+              <a:t>Local storage [text log file]</a:t>
             </a:r>
             <a:endParaRPr lang="en-SG" sz="900" dirty="0"/>
           </a:p>
@@ -4838,8 +4838,8 @@
         </p:nvSpPr>
         <p:spPr>
           <a:xfrm>
-            <a:off x="1131090" y="2776814"/>
-            <a:ext cx="2993645" cy="1643752"/>
+            <a:off x="865554" y="2799732"/>
+            <a:ext cx="3400519" cy="1825345"/>
           </a:xfrm>
           <a:prstGeom prst="rect">
             <a:avLst/>
@@ -4931,8 +4931,8 @@
         </p:nvCxnSpPr>
         <p:spPr>
           <a:xfrm flipH="1" flipV="1">
-            <a:off x="3502778" y="3937527"/>
-            <a:ext cx="2819603" cy="7248"/>
+            <a:off x="3919873" y="3938339"/>
+            <a:ext cx="2402508" cy="6436"/>
           </a:xfrm>
           <a:prstGeom prst="straightConnector1">
             <a:avLst/>
@@ -4973,7 +4973,7 @@
         </p:nvSpPr>
         <p:spPr>
           <a:xfrm>
-            <a:off x="2679190" y="3869520"/>
+            <a:off x="3003150" y="3869161"/>
             <a:ext cx="802249" cy="329535"/>
           </a:xfrm>
           <a:prstGeom prst="rect">
@@ -5025,7 +5025,7 @@
         </p:nvCxnSpPr>
         <p:spPr>
           <a:xfrm flipV="1">
-            <a:off x="3236676" y="3670537"/>
+            <a:off x="3502778" y="3654598"/>
             <a:ext cx="0" cy="198983"/>
           </a:xfrm>
           <a:prstGeom prst="straightConnector1">
@@ -5075,7 +5075,7 @@
         </p:blipFill>
         <p:spPr>
           <a:xfrm>
-            <a:off x="2879053" y="3025203"/>
+            <a:off x="3203046" y="3024951"/>
             <a:ext cx="636948" cy="629395"/>
           </a:xfrm>
           <a:prstGeom prst="rect">
@@ -5100,7 +5100,7 @@
         <p:spPr>
           <a:xfrm flipH="1" flipV="1">
             <a:off x="2346218" y="3670537"/>
-            <a:ext cx="332972" cy="224699"/>
+            <a:ext cx="668239" cy="209962"/>
           </a:xfrm>
           <a:prstGeom prst="straightConnector1">
             <a:avLst/>
@@ -5141,8 +5141,8 @@
         </p:nvSpPr>
         <p:spPr>
           <a:xfrm rot="10800000">
-            <a:off x="2346218" y="3390354"/>
-            <a:ext cx="490159" cy="141665"/>
+            <a:off x="2346217" y="3390354"/>
+            <a:ext cx="802248" cy="120364"/>
           </a:xfrm>
           <a:prstGeom prst="rightArrow">
             <a:avLst/>
@@ -5456,7 +5456,7 @@
         </p:nvSpPr>
         <p:spPr>
           <a:xfrm>
-            <a:off x="2372599" y="3238170"/>
+            <a:off x="2383224" y="3172165"/>
             <a:ext cx="802249" cy="230832"/>
           </a:xfrm>
           <a:prstGeom prst="rect">
@@ -5748,6 +5748,406 @@
           </a:p>
         </p:txBody>
       </p:sp>
+      <p:sp>
+        <p:nvSpPr>
+          <p:cNvPr id="18" name="Rectangle 17">
+            <a:extLst>
+              <a:ext uri="{FF2B5EF4-FFF2-40B4-BE49-F238E27FC236}">
+                <a16:creationId xmlns:a16="http://schemas.microsoft.com/office/drawing/2014/main" id="{3CE4CB6F-231C-53F7-701A-4F7EDEF7C880}"/>
+              </a:ext>
+            </a:extLst>
+          </p:cNvPr>
+          <p:cNvSpPr/>
+          <p:nvPr/>
+        </p:nvSpPr>
+        <p:spPr>
+          <a:xfrm>
+            <a:off x="2109530" y="4196234"/>
+            <a:ext cx="802249" cy="329535"/>
+          </a:xfrm>
+          <a:prstGeom prst="rect">
+            <a:avLst/>
+          </a:prstGeom>
+        </p:spPr>
+        <p:style>
+          <a:lnRef idx="2">
+            <a:schemeClr val="accent1">
+              <a:shade val="50000"/>
+            </a:schemeClr>
+          </a:lnRef>
+          <a:fillRef idx="1">
+            <a:schemeClr val="accent1"/>
+          </a:fillRef>
+          <a:effectRef idx="0">
+            <a:schemeClr val="accent1"/>
+          </a:effectRef>
+          <a:fontRef idx="minor">
+            <a:schemeClr val="lt1"/>
+          </a:fontRef>
+        </p:style>
+        <p:txBody>
+          <a:bodyPr rtlCol="0" anchor="ctr"/>
+          <a:lstStyle/>
+          <a:p>
+            <a:pPr algn="ctr"/>
+            <a:r>
+              <a:rPr lang="en-SG" sz="900" dirty="0"/>
+              <a:t>alert raise module </a:t>
+            </a:r>
+          </a:p>
+        </p:txBody>
+      </p:sp>
+      <p:sp>
+        <p:nvSpPr>
+          <p:cNvPr id="23" name="Rectangle 22">
+            <a:extLst>
+              <a:ext uri="{FF2B5EF4-FFF2-40B4-BE49-F238E27FC236}">
+                <a16:creationId xmlns:a16="http://schemas.microsoft.com/office/drawing/2014/main" id="{0D7333E1-C362-17CE-3F0F-263CF26753BF}"/>
+              </a:ext>
+            </a:extLst>
+          </p:cNvPr>
+          <p:cNvSpPr/>
+          <p:nvPr/>
+        </p:nvSpPr>
+        <p:spPr>
+          <a:xfrm>
+            <a:off x="1000533" y="3924155"/>
+            <a:ext cx="1001478" cy="272080"/>
+          </a:xfrm>
+          <a:prstGeom prst="rect">
+            <a:avLst/>
+          </a:prstGeom>
+        </p:spPr>
+        <p:style>
+          <a:lnRef idx="2">
+            <a:schemeClr val="accent1">
+              <a:shade val="50000"/>
+            </a:schemeClr>
+          </a:lnRef>
+          <a:fillRef idx="1">
+            <a:schemeClr val="accent1"/>
+          </a:fillRef>
+          <a:effectRef idx="0">
+            <a:schemeClr val="accent1"/>
+          </a:effectRef>
+          <a:fontRef idx="minor">
+            <a:schemeClr val="lt1"/>
+          </a:fontRef>
+        </p:style>
+        <p:txBody>
+          <a:bodyPr rtlCol="0" anchor="ctr"/>
+          <a:lstStyle/>
+          <a:p>
+            <a:pPr algn="ctr"/>
+            <a:r>
+              <a:rPr lang="en-SG" sz="900" dirty="0"/>
+              <a:t>Connection map module</a:t>
+            </a:r>
+          </a:p>
+        </p:txBody>
+      </p:sp>
+      <p:cxnSp>
+        <p:nvCxnSpPr>
+          <p:cNvPr id="31" name="Connector: Elbow 30">
+            <a:extLst>
+              <a:ext uri="{FF2B5EF4-FFF2-40B4-BE49-F238E27FC236}">
+                <a16:creationId xmlns:a16="http://schemas.microsoft.com/office/drawing/2014/main" id="{0E2B4FA1-DA9C-4521-BC61-21DDF15631D5}"/>
+              </a:ext>
+            </a:extLst>
+          </p:cNvPr>
+          <p:cNvCxnSpPr>
+            <a:stCxn id="1024" idx="2"/>
+            <a:endCxn id="18" idx="3"/>
+          </p:cNvCxnSpPr>
+          <p:nvPr/>
+        </p:nvCxnSpPr>
+        <p:spPr>
+          <a:xfrm rot="5400000">
+            <a:off x="3076874" y="4033601"/>
+            <a:ext cx="162306" cy="492496"/>
+          </a:xfrm>
+          <a:prstGeom prst="bentConnector2">
+            <a:avLst/>
+          </a:prstGeom>
+          <a:ln>
+            <a:solidFill>
+              <a:schemeClr val="tx1"/>
+            </a:solidFill>
+            <a:tailEnd type="triangle"/>
+          </a:ln>
+        </p:spPr>
+        <p:style>
+          <a:lnRef idx="1">
+            <a:schemeClr val="accent1"/>
+          </a:lnRef>
+          <a:fillRef idx="0">
+            <a:schemeClr val="accent1"/>
+          </a:fillRef>
+          <a:effectRef idx="0">
+            <a:schemeClr val="accent1"/>
+          </a:effectRef>
+          <a:fontRef idx="minor">
+            <a:schemeClr val="tx1"/>
+          </a:fontRef>
+        </p:style>
+      </p:cxnSp>
+      <p:cxnSp>
+        <p:nvCxnSpPr>
+          <p:cNvPr id="40" name="Straight Arrow Connector 39">
+            <a:extLst>
+              <a:ext uri="{FF2B5EF4-FFF2-40B4-BE49-F238E27FC236}">
+                <a16:creationId xmlns:a16="http://schemas.microsoft.com/office/drawing/2014/main" id="{88DAD442-9477-8FF0-02C1-AA3F03225BEB}"/>
+              </a:ext>
+            </a:extLst>
+          </p:cNvPr>
+          <p:cNvCxnSpPr>
+            <a:cxnSpLocks/>
+          </p:cNvCxnSpPr>
+          <p:nvPr/>
+        </p:nvCxnSpPr>
+        <p:spPr>
+          <a:xfrm flipH="1" flipV="1">
+            <a:off x="1494845" y="3737113"/>
+            <a:ext cx="2998" cy="184807"/>
+          </a:xfrm>
+          <a:prstGeom prst="straightConnector1">
+            <a:avLst/>
+          </a:prstGeom>
+          <a:ln>
+            <a:solidFill>
+              <a:schemeClr val="tx1"/>
+            </a:solidFill>
+            <a:tailEnd type="triangle"/>
+          </a:ln>
+        </p:spPr>
+        <p:style>
+          <a:lnRef idx="1">
+            <a:schemeClr val="accent1"/>
+          </a:lnRef>
+          <a:fillRef idx="0">
+            <a:schemeClr val="accent1"/>
+          </a:fillRef>
+          <a:effectRef idx="0">
+            <a:schemeClr val="accent1"/>
+          </a:effectRef>
+          <a:fontRef idx="minor">
+            <a:schemeClr val="tx1"/>
+          </a:fontRef>
+        </p:style>
+      </p:cxnSp>
+      <p:sp>
+        <p:nvSpPr>
+          <p:cNvPr id="44" name="TextBox 43">
+            <a:extLst>
+              <a:ext uri="{FF2B5EF4-FFF2-40B4-BE49-F238E27FC236}">
+                <a16:creationId xmlns:a16="http://schemas.microsoft.com/office/drawing/2014/main" id="{FBA81C9E-C62A-5B17-0F00-86E66A58ED56}"/>
+              </a:ext>
+            </a:extLst>
+          </p:cNvPr>
+          <p:cNvSpPr txBox="1"/>
+          <p:nvPr/>
+        </p:nvSpPr>
+        <p:spPr>
+          <a:xfrm>
+            <a:off x="1462993" y="3708566"/>
+            <a:ext cx="802249" cy="230832"/>
+          </a:xfrm>
+          <a:prstGeom prst="rect">
+            <a:avLst/>
+          </a:prstGeom>
+          <a:noFill/>
+        </p:spPr>
+        <p:txBody>
+          <a:bodyPr wrap="square" rtlCol="0">
+            <a:spAutoFit/>
+          </a:bodyPr>
+          <a:lstStyle/>
+          <a:p>
+            <a:r>
+              <a:rPr lang="en-US" sz="900" dirty="0">
+                <a:solidFill>
+                  <a:srgbClr val="002060"/>
+                </a:solidFill>
+              </a:rPr>
+              <a:t>Ajax:5000</a:t>
+            </a:r>
+            <a:endParaRPr lang="en-SG" sz="900" dirty="0">
+              <a:solidFill>
+                <a:srgbClr val="002060"/>
+              </a:solidFill>
+            </a:endParaRPr>
+          </a:p>
+        </p:txBody>
+      </p:sp>
+      <p:cxnSp>
+        <p:nvCxnSpPr>
+          <p:cNvPr id="46" name="Straight Arrow Connector 45">
+            <a:extLst>
+              <a:ext uri="{FF2B5EF4-FFF2-40B4-BE49-F238E27FC236}">
+                <a16:creationId xmlns:a16="http://schemas.microsoft.com/office/drawing/2014/main" id="{A9AADEF5-9B44-5FAD-4679-8037363903F9}"/>
+              </a:ext>
+            </a:extLst>
+          </p:cNvPr>
+          <p:cNvCxnSpPr>
+            <a:cxnSpLocks/>
+          </p:cNvCxnSpPr>
+          <p:nvPr/>
+        </p:nvCxnSpPr>
+        <p:spPr>
+          <a:xfrm flipH="1" flipV="1">
+            <a:off x="1625355" y="4428086"/>
+            <a:ext cx="458958" cy="2008"/>
+          </a:xfrm>
+          <a:prstGeom prst="straightConnector1">
+            <a:avLst/>
+          </a:prstGeom>
+          <a:ln>
+            <a:solidFill>
+              <a:schemeClr val="tx1"/>
+            </a:solidFill>
+            <a:tailEnd type="triangle"/>
+          </a:ln>
+        </p:spPr>
+        <p:style>
+          <a:lnRef idx="1">
+            <a:schemeClr val="accent1"/>
+          </a:lnRef>
+          <a:fillRef idx="0">
+            <a:schemeClr val="accent1"/>
+          </a:fillRef>
+          <a:effectRef idx="0">
+            <a:schemeClr val="accent1"/>
+          </a:effectRef>
+          <a:fontRef idx="minor">
+            <a:schemeClr val="tx1"/>
+          </a:fontRef>
+        </p:style>
+      </p:cxnSp>
+      <p:sp>
+        <p:nvSpPr>
+          <p:cNvPr id="49" name="Cylinder 48">
+            <a:extLst>
+              <a:ext uri="{FF2B5EF4-FFF2-40B4-BE49-F238E27FC236}">
+                <a16:creationId xmlns:a16="http://schemas.microsoft.com/office/drawing/2014/main" id="{0F745472-A8A9-F6DC-8B60-FD6A55B7201A}"/>
+              </a:ext>
+            </a:extLst>
+          </p:cNvPr>
+          <p:cNvSpPr/>
+          <p:nvPr/>
+        </p:nvSpPr>
+        <p:spPr>
+          <a:xfrm>
+            <a:off x="1422789" y="4360719"/>
+            <a:ext cx="204817" cy="171879"/>
+          </a:xfrm>
+          <a:prstGeom prst="can">
+            <a:avLst/>
+          </a:prstGeom>
+        </p:spPr>
+        <p:style>
+          <a:lnRef idx="2">
+            <a:schemeClr val="accent1">
+              <a:shade val="50000"/>
+            </a:schemeClr>
+          </a:lnRef>
+          <a:fillRef idx="1">
+            <a:schemeClr val="accent1"/>
+          </a:fillRef>
+          <a:effectRef idx="0">
+            <a:schemeClr val="accent1"/>
+          </a:effectRef>
+          <a:fontRef idx="minor">
+            <a:schemeClr val="lt1"/>
+          </a:fontRef>
+        </p:style>
+        <p:txBody>
+          <a:bodyPr rtlCol="0" anchor="ctr"/>
+          <a:lstStyle/>
+          <a:p>
+            <a:pPr algn="ctr"/>
+            <a:endParaRPr lang="en-SG"/>
+          </a:p>
+        </p:txBody>
+      </p:sp>
+      <p:sp>
+        <p:nvSpPr>
+          <p:cNvPr id="55" name="TextBox 54">
+            <a:extLst>
+              <a:ext uri="{FF2B5EF4-FFF2-40B4-BE49-F238E27FC236}">
+                <a16:creationId xmlns:a16="http://schemas.microsoft.com/office/drawing/2014/main" id="{6A7172A8-36AA-2933-69EE-288E6545B5F4}"/>
+              </a:ext>
+            </a:extLst>
+          </p:cNvPr>
+          <p:cNvSpPr txBox="1"/>
+          <p:nvPr/>
+        </p:nvSpPr>
+        <p:spPr>
+          <a:xfrm>
+            <a:off x="843057" y="4462715"/>
+            <a:ext cx="1102290" cy="230832"/>
+          </a:xfrm>
+          <a:prstGeom prst="rect">
+            <a:avLst/>
+          </a:prstGeom>
+          <a:noFill/>
+        </p:spPr>
+        <p:txBody>
+          <a:bodyPr wrap="square" rtlCol="0">
+            <a:spAutoFit/>
+          </a:bodyPr>
+          <a:lstStyle/>
+          <a:p>
+            <a:r>
+              <a:rPr lang="en-SG" sz="900" dirty="0"/>
+              <a:t>Alert History DB</a:t>
+            </a:r>
+          </a:p>
+        </p:txBody>
+      </p:sp>
+      <p:cxnSp>
+        <p:nvCxnSpPr>
+          <p:cNvPr id="59" name="Straight Arrow Connector 58">
+            <a:extLst>
+              <a:ext uri="{FF2B5EF4-FFF2-40B4-BE49-F238E27FC236}">
+                <a16:creationId xmlns:a16="http://schemas.microsoft.com/office/drawing/2014/main" id="{72023996-EEC9-48DC-1399-0758043323AA}"/>
+              </a:ext>
+            </a:extLst>
+          </p:cNvPr>
+          <p:cNvCxnSpPr>
+            <a:cxnSpLocks/>
+          </p:cNvCxnSpPr>
+          <p:nvPr/>
+        </p:nvCxnSpPr>
+        <p:spPr>
+          <a:xfrm flipV="1">
+            <a:off x="1489676" y="4196234"/>
+            <a:ext cx="0" cy="152400"/>
+          </a:xfrm>
+          <a:prstGeom prst="straightConnector1">
+            <a:avLst/>
+          </a:prstGeom>
+          <a:ln>
+            <a:solidFill>
+              <a:schemeClr val="tx1"/>
+            </a:solidFill>
+            <a:tailEnd type="triangle"/>
+          </a:ln>
+        </p:spPr>
+        <p:style>
+          <a:lnRef idx="1">
+            <a:schemeClr val="accent1"/>
+          </a:lnRef>
+          <a:fillRef idx="0">
+            <a:schemeClr val="accent1"/>
+          </a:fillRef>
+          <a:effectRef idx="0">
+            <a:schemeClr val="accent1"/>
+          </a:effectRef>
+          <a:fontRef idx="minor">
+            <a:schemeClr val="tx1"/>
+          </a:fontRef>
+        </p:style>
+      </p:cxnSp>
     </p:spTree>
     <p:extLst>
       <p:ext uri="{BB962C8B-B14F-4D97-AF65-F5344CB8AC3E}">

</xml_diff>

<commit_message>
Added the new changes: 1. update the code design doc. 2. link all the lib module usage to the lib folder. 3. Add the config files and the peer json file.
</commit_message>
<xml_diff>
--- a/doc/designDoc.pptx
+++ b/doc/designDoc.pptx
@@ -4162,7 +4162,7 @@
         </p:nvSpPr>
         <p:spPr>
           <a:xfrm>
-            <a:off x="8710296" y="1445201"/>
+            <a:off x="8676458" y="1445201"/>
             <a:ext cx="956953" cy="512956"/>
           </a:xfrm>
           <a:prstGeom prst="cloud">
@@ -5155,8 +5155,8 @@
         </p:nvCxnSpPr>
         <p:spPr>
           <a:xfrm flipH="1" flipV="1">
-            <a:off x="3848194" y="4131288"/>
-            <a:ext cx="1982278" cy="1163834"/>
+            <a:off x="3865678" y="4150721"/>
+            <a:ext cx="1964794" cy="1144401"/>
           </a:xfrm>
           <a:prstGeom prst="straightConnector1">
             <a:avLst/>
@@ -7132,7 +7132,7 @@
         </p:nvCxnSpPr>
         <p:spPr>
           <a:xfrm rot="5400000" flipH="1" flipV="1">
-            <a:off x="6037091" y="2601996"/>
+            <a:off x="6003253" y="2601996"/>
             <a:ext cx="3796066" cy="2507297"/>
           </a:xfrm>
           <a:prstGeom prst="bentConnector3">
@@ -7719,7 +7719,7 @@
         </p:blipFill>
         <p:spPr>
           <a:xfrm>
-            <a:off x="5995407" y="3314576"/>
+            <a:off x="5995407" y="3425890"/>
             <a:ext cx="254941" cy="254941"/>
           </a:xfrm>
           <a:prstGeom prst="rect">
@@ -7749,8 +7749,8 @@
         </p:nvCxnSpPr>
         <p:spPr>
           <a:xfrm flipH="1">
-            <a:off x="3865814" y="3442047"/>
-            <a:ext cx="2129593" cy="547629"/>
+            <a:off x="3844195" y="3553361"/>
+            <a:ext cx="2151212" cy="386543"/>
           </a:xfrm>
           <a:prstGeom prst="straightConnector1">
             <a:avLst/>

</xml_diff>